<commit_message>
ultima version de ppt cap 1
</commit_message>
<xml_diff>
--- a/Material de Alumno/Ing de Software.pptx
+++ b/Material de Alumno/Ing de Software.pptx
@@ -4,6 +4,9 @@
   <p:sldMasterIdLst>
     <p:sldMasterId id="2147483724" r:id="rId1"/>
   </p:sldMasterIdLst>
+  <p:handoutMasterIdLst>
+    <p:handoutMasterId r:id="rId45"/>
+  </p:handoutMasterIdLst>
   <p:sldIdLst>
     <p:sldId id="256" r:id="rId2"/>
     <p:sldId id="257" r:id="rId3"/>
@@ -50,7 +53,7 @@
     <p:sldId id="300" r:id="rId44"/>
   </p:sldIdLst>
   <p:sldSz cx="12192000" cy="6858000"/>
-  <p:notesSz cx="6858000" cy="9144000"/>
+  <p:notesSz cx="7010400" cy="9296400"/>
   <p:defaultTextStyle>
     <a:defPPr>
       <a:defRPr lang="en-US"/>
@@ -12048,6 +12051,171 @@
 </dgm:styleDef>
 </file>
 
+<file path=ppt/handoutMasters/handoutMaster1.xml><?xml version="1.0" encoding="utf-8"?>
+<p:handoutMaster xmlns:a="http://schemas.openxmlformats.org/drawingml/2006/main" xmlns:r="http://schemas.openxmlformats.org/officeDocument/2006/relationships" xmlns:p="http://schemas.openxmlformats.org/presentationml/2006/main">
+  <p:cSld>
+    <p:bg>
+      <p:bgRef idx="1001">
+        <a:schemeClr val="bg1"/>
+      </p:bgRef>
+    </p:bg>
+    <p:spTree>
+      <p:nvGrpSpPr>
+        <p:cNvPr id="1" name=""/>
+        <p:cNvGrpSpPr/>
+        <p:nvPr/>
+      </p:nvGrpSpPr>
+      <p:grpSpPr>
+        <a:xfrm>
+          <a:off x="0" y="0"/>
+          <a:ext cx="0" cy="0"/>
+          <a:chOff x="0" y="0"/>
+          <a:chExt cx="0" cy="0"/>
+        </a:xfrm>
+      </p:grpSpPr>
+      <p:sp>
+        <p:nvSpPr>
+          <p:cNvPr id="2" name="Header Placeholder 1"/>
+          <p:cNvSpPr>
+            <a:spLocks noGrp="1"/>
+          </p:cNvSpPr>
+          <p:nvPr>
+            <p:ph type="hdr" sz="quarter"/>
+          </p:nvPr>
+        </p:nvSpPr>
+        <p:spPr>
+          <a:xfrm>
+            <a:off x="0" y="0"/>
+            <a:ext cx="3037840" cy="466434"/>
+          </a:xfrm>
+          <a:prstGeom prst="rect">
+            <a:avLst/>
+          </a:prstGeom>
+        </p:spPr>
+        <p:txBody>
+          <a:bodyPr vert="horz" lIns="93177" tIns="46589" rIns="93177" bIns="46589" rtlCol="0"/>
+          <a:lstStyle>
+            <a:lvl1pPr algn="l">
+              <a:defRPr sz="1200"/>
+            </a:lvl1pPr>
+          </a:lstStyle>
+          <a:p>
+            <a:endParaRPr lang="en-US"/>
+          </a:p>
+        </p:txBody>
+      </p:sp>
+      <p:sp>
+        <p:nvSpPr>
+          <p:cNvPr id="3" name="Date Placeholder 2"/>
+          <p:cNvSpPr>
+            <a:spLocks noGrp="1"/>
+          </p:cNvSpPr>
+          <p:nvPr>
+            <p:ph type="dt" sz="quarter" idx="1"/>
+          </p:nvPr>
+        </p:nvSpPr>
+        <p:spPr>
+          <a:xfrm>
+            <a:off x="3970938" y="0"/>
+            <a:ext cx="3037840" cy="466434"/>
+          </a:xfrm>
+          <a:prstGeom prst="rect">
+            <a:avLst/>
+          </a:prstGeom>
+        </p:spPr>
+        <p:txBody>
+          <a:bodyPr vert="horz" lIns="93177" tIns="46589" rIns="93177" bIns="46589" rtlCol="0"/>
+          <a:lstStyle>
+            <a:lvl1pPr algn="r">
+              <a:defRPr sz="1200"/>
+            </a:lvl1pPr>
+          </a:lstStyle>
+          <a:p>
+            <a:fld id="{1FB8963C-832E-41D7-97A0-F45EDAC17290}" type="datetimeFigureOut">
+              <a:rPr lang="en-US" smtClean="0"/>
+              <a:t>4/20/2016</a:t>
+            </a:fld>
+            <a:endParaRPr lang="en-US"/>
+          </a:p>
+        </p:txBody>
+      </p:sp>
+      <p:sp>
+        <p:nvSpPr>
+          <p:cNvPr id="4" name="Footer Placeholder 3"/>
+          <p:cNvSpPr>
+            <a:spLocks noGrp="1"/>
+          </p:cNvSpPr>
+          <p:nvPr>
+            <p:ph type="ftr" sz="quarter" idx="2"/>
+          </p:nvPr>
+        </p:nvSpPr>
+        <p:spPr>
+          <a:xfrm>
+            <a:off x="0" y="8829967"/>
+            <a:ext cx="3037840" cy="466433"/>
+          </a:xfrm>
+          <a:prstGeom prst="rect">
+            <a:avLst/>
+          </a:prstGeom>
+        </p:spPr>
+        <p:txBody>
+          <a:bodyPr vert="horz" lIns="93177" tIns="46589" rIns="93177" bIns="46589" rtlCol="0" anchor="b"/>
+          <a:lstStyle>
+            <a:lvl1pPr algn="l">
+              <a:defRPr sz="1200"/>
+            </a:lvl1pPr>
+          </a:lstStyle>
+          <a:p>
+            <a:endParaRPr lang="en-US"/>
+          </a:p>
+        </p:txBody>
+      </p:sp>
+      <p:sp>
+        <p:nvSpPr>
+          <p:cNvPr id="5" name="Slide Number Placeholder 4"/>
+          <p:cNvSpPr>
+            <a:spLocks noGrp="1"/>
+          </p:cNvSpPr>
+          <p:nvPr>
+            <p:ph type="sldNum" sz="quarter" idx="3"/>
+          </p:nvPr>
+        </p:nvSpPr>
+        <p:spPr>
+          <a:xfrm>
+            <a:off x="3970938" y="8829967"/>
+            <a:ext cx="3037840" cy="466433"/>
+          </a:xfrm>
+          <a:prstGeom prst="rect">
+            <a:avLst/>
+          </a:prstGeom>
+        </p:spPr>
+        <p:txBody>
+          <a:bodyPr vert="horz" lIns="93177" tIns="46589" rIns="93177" bIns="46589" rtlCol="0" anchor="b"/>
+          <a:lstStyle>
+            <a:lvl1pPr algn="r">
+              <a:defRPr sz="1200"/>
+            </a:lvl1pPr>
+          </a:lstStyle>
+          <a:p>
+            <a:fld id="{F1B3C096-B3DE-4978-BB5D-2037650F6104}" type="slidenum">
+              <a:rPr lang="en-US" smtClean="0"/>
+              <a:t>‹#›</a:t>
+            </a:fld>
+            <a:endParaRPr lang="en-US"/>
+          </a:p>
+        </p:txBody>
+      </p:sp>
+    </p:spTree>
+    <p:extLst>
+      <p:ext uri="{BB962C8B-B14F-4D97-AF65-F5344CB8AC3E}">
+        <p14:creationId xmlns:p14="http://schemas.microsoft.com/office/powerpoint/2010/main" val="2566262003"/>
+      </p:ext>
+    </p:extLst>
+  </p:cSld>
+  <p:clrMap bg1="lt1" tx1="dk1" bg2="lt2" tx2="dk2" accent1="accent1" accent2="accent2" accent3="accent3" accent4="accent4" accent5="accent5" accent6="accent6" hlink="hlink" folHlink="folHlink"/>
+</p:handoutMaster>
+</file>
+
 <file path=ppt/slideLayouts/slideLayout1.xml><?xml version="1.0" encoding="utf-8"?>
 <p:sldLayout xmlns:a="http://schemas.openxmlformats.org/drawingml/2006/main" xmlns:r="http://schemas.openxmlformats.org/officeDocument/2006/relationships" xmlns:p="http://schemas.openxmlformats.org/presentationml/2006/main" type="title" preserve="1">
   <p:cSld name="Title Slide">
@@ -20067,6 +20235,13 @@
   <p:clrMapOvr>
     <a:masterClrMapping/>
   </p:clrMapOvr>
+  <p:timing>
+    <p:tnLst>
+      <p:par>
+        <p:cTn id="1" dur="indefinite" restart="never" nodeType="tmRoot"/>
+      </p:par>
+    </p:tnLst>
+  </p:timing>
 </p:sld>
 </file>
 
@@ -20206,6 +20381,13 @@
   <p:clrMapOvr>
     <a:masterClrMapping/>
   </p:clrMapOvr>
+  <p:timing>
+    <p:tnLst>
+      <p:par>
+        <p:cTn id="1" dur="indefinite" restart="never" nodeType="tmRoot"/>
+      </p:par>
+    </p:tnLst>
+  </p:timing>
 </p:sld>
 </file>
 
@@ -20418,6 +20600,13 @@
   <p:clrMapOvr>
     <a:masterClrMapping/>
   </p:clrMapOvr>
+  <p:timing>
+    <p:tnLst>
+      <p:par>
+        <p:cTn id="1" dur="indefinite" restart="never" nodeType="tmRoot"/>
+      </p:par>
+    </p:tnLst>
+  </p:timing>
 </p:sld>
 </file>
 
@@ -20520,6 +20709,13 @@
   <p:clrMapOvr>
     <a:masterClrMapping/>
   </p:clrMapOvr>
+  <p:timing>
+    <p:tnLst>
+      <p:par>
+        <p:cTn id="1" dur="indefinite" restart="never" nodeType="tmRoot"/>
+      </p:par>
+    </p:tnLst>
+  </p:timing>
 </p:sld>
 </file>
 
@@ -20629,6 +20825,13 @@
   <p:clrMapOvr>
     <a:masterClrMapping/>
   </p:clrMapOvr>
+  <p:timing>
+    <p:tnLst>
+      <p:par>
+        <p:cTn id="1" dur="indefinite" restart="never" nodeType="tmRoot"/>
+      </p:par>
+    </p:tnLst>
+  </p:timing>
 </p:sld>
 </file>
 
@@ -20735,6 +20938,13 @@
   <p:clrMapOvr>
     <a:masterClrMapping/>
   </p:clrMapOvr>
+  <p:timing>
+    <p:tnLst>
+      <p:par>
+        <p:cTn id="1" dur="indefinite" restart="never" nodeType="tmRoot"/>
+      </p:par>
+    </p:tnLst>
+  </p:timing>
 </p:sld>
 </file>
 
@@ -21818,6 +22028,13 @@
   <p:clrMapOvr>
     <a:masterClrMapping/>
   </p:clrMapOvr>
+  <p:timing>
+    <p:tnLst>
+      <p:par>
+        <p:cTn id="1" dur="indefinite" restart="never" nodeType="tmRoot"/>
+      </p:par>
+    </p:tnLst>
+  </p:timing>
 </p:sld>
 </file>
 
@@ -21963,8 +22180,8 @@
         </p:blipFill>
         <p:spPr>
           <a:xfrm>
-            <a:off x="7040511" y="3356125"/>
-            <a:ext cx="3869944" cy="2194725"/>
+            <a:off x="7807569" y="4022411"/>
+            <a:ext cx="3271698" cy="1855447"/>
           </a:xfrm>
           <a:prstGeom prst="rect">
             <a:avLst/>
@@ -21981,6 +22198,13 @@
   <p:clrMapOvr>
     <a:masterClrMapping/>
   </p:clrMapOvr>
+  <p:timing>
+    <p:tnLst>
+      <p:par>
+        <p:cTn id="1" dur="indefinite" restart="never" nodeType="tmRoot"/>
+      </p:par>
+    </p:tnLst>
+  </p:timing>
 </p:sld>
 </file>
 
@@ -22143,6 +22367,13 @@
   <p:clrMapOvr>
     <a:masterClrMapping/>
   </p:clrMapOvr>
+  <p:timing>
+    <p:tnLst>
+      <p:par>
+        <p:cTn id="1" dur="indefinite" restart="never" nodeType="tmRoot"/>
+      </p:par>
+    </p:tnLst>
+  </p:timing>
 </p:sld>
 </file>
 
@@ -22283,6 +22514,13 @@
   <p:clrMapOvr>
     <a:masterClrMapping/>
   </p:clrMapOvr>
+  <p:timing>
+    <p:tnLst>
+      <p:par>
+        <p:cTn id="1" dur="indefinite" restart="never" nodeType="tmRoot"/>
+      </p:par>
+    </p:tnLst>
+  </p:timing>
 </p:sld>
 </file>
 
@@ -22405,6 +22643,13 @@
   <p:clrMapOvr>
     <a:masterClrMapping/>
   </p:clrMapOvr>
+  <p:timing>
+    <p:tnLst>
+      <p:par>
+        <p:cTn id="1" dur="indefinite" restart="never" nodeType="tmRoot"/>
+      </p:par>
+    </p:tnLst>
+  </p:timing>
 </p:sld>
 </file>
 
@@ -22532,6 +22777,13 @@
   <p:clrMapOvr>
     <a:masterClrMapping/>
   </p:clrMapOvr>
+  <p:timing>
+    <p:tnLst>
+      <p:par>
+        <p:cTn id="1" dur="indefinite" restart="never" nodeType="tmRoot"/>
+      </p:par>
+    </p:tnLst>
+  </p:timing>
 </p:sld>
 </file>
 
@@ -22664,6 +22916,13 @@
   <p:clrMapOvr>
     <a:masterClrMapping/>
   </p:clrMapOvr>
+  <p:timing>
+    <p:tnLst>
+      <p:par>
+        <p:cTn id="1" dur="indefinite" restart="never" nodeType="tmRoot"/>
+      </p:par>
+    </p:tnLst>
+  </p:timing>
 </p:sld>
 </file>
 
@@ -22969,6 +23228,13 @@
   <p:clrMapOvr>
     <a:masterClrMapping/>
   </p:clrMapOvr>
+  <p:timing>
+    <p:tnLst>
+      <p:par>
+        <p:cTn id="1" dur="indefinite" restart="never" nodeType="tmRoot"/>
+      </p:par>
+    </p:tnLst>
+  </p:timing>
 </p:sld>
 </file>
 
@@ -23088,6 +23354,13 @@
   <p:clrMapOvr>
     <a:masterClrMapping/>
   </p:clrMapOvr>
+  <p:timing>
+    <p:tnLst>
+      <p:par>
+        <p:cTn id="1" dur="indefinite" restart="never" nodeType="tmRoot"/>
+      </p:par>
+    </p:tnLst>
+  </p:timing>
 </p:sld>
 </file>
 
@@ -23275,6 +23548,13 @@
   <p:clrMapOvr>
     <a:masterClrMapping/>
   </p:clrMapOvr>
+  <p:timing>
+    <p:tnLst>
+      <p:par>
+        <p:cTn id="1" dur="indefinite" restart="never" nodeType="tmRoot"/>
+      </p:par>
+    </p:tnLst>
+  </p:timing>
 </p:sld>
 </file>
 
@@ -23452,6 +23732,13 @@
   <p:clrMapOvr>
     <a:masterClrMapping/>
   </p:clrMapOvr>
+  <p:timing>
+    <p:tnLst>
+      <p:par>
+        <p:cTn id="1" dur="indefinite" restart="never" nodeType="tmRoot"/>
+      </p:par>
+    </p:tnLst>
+  </p:timing>
 </p:sld>
 </file>
 
@@ -23575,6 +23862,13 @@
   <p:clrMapOvr>
     <a:masterClrMapping/>
   </p:clrMapOvr>
+  <p:timing>
+    <p:tnLst>
+      <p:par>
+        <p:cTn id="1" dur="indefinite" restart="never" nodeType="tmRoot"/>
+      </p:par>
+    </p:tnLst>
+  </p:timing>
 </p:sld>
 </file>
 
@@ -23639,6 +23933,13 @@
   <p:clrMapOvr>
     <a:masterClrMapping/>
   </p:clrMapOvr>
+  <p:timing>
+    <p:tnLst>
+      <p:par>
+        <p:cTn id="1" dur="indefinite" restart="never" nodeType="tmRoot"/>
+      </p:par>
+    </p:tnLst>
+  </p:timing>
 </p:sld>
 </file>
 
@@ -24026,6 +24327,13 @@
   <p:clrMapOvr>
     <a:masterClrMapping/>
   </p:clrMapOvr>
+  <p:timing>
+    <p:tnLst>
+      <p:par>
+        <p:cTn id="1" dur="indefinite" restart="never" nodeType="tmRoot"/>
+      </p:par>
+    </p:tnLst>
+  </p:timing>
 </p:sld>
 </file>
 
@@ -25034,6 +25342,13 @@
   <p:clrMapOvr>
     <a:masterClrMapping/>
   </p:clrMapOvr>
+  <p:timing>
+    <p:tnLst>
+      <p:par>
+        <p:cTn id="1" dur="indefinite" restart="never" nodeType="tmRoot"/>
+      </p:par>
+    </p:tnLst>
+  </p:timing>
 </p:sld>
 </file>
 
@@ -25224,6 +25539,13 @@
   <p:clrMapOvr>
     <a:masterClrMapping/>
   </p:clrMapOvr>
+  <p:timing>
+    <p:tnLst>
+      <p:par>
+        <p:cTn id="1" dur="indefinite" restart="never" nodeType="tmRoot"/>
+      </p:par>
+    </p:tnLst>
+  </p:timing>
 </p:sld>
 </file>
 
@@ -25283,6 +25605,13 @@
   <p:clrMapOvr>
     <a:masterClrMapping/>
   </p:clrMapOvr>
+  <p:timing>
+    <p:tnLst>
+      <p:par>
+        <p:cTn id="1" dur="indefinite" restart="never" nodeType="tmRoot"/>
+      </p:par>
+    </p:tnLst>
+  </p:timing>
 </p:sld>
 </file>
 
@@ -26458,6 +26787,13 @@
   <p:clrMapOvr>
     <a:masterClrMapping/>
   </p:clrMapOvr>
+  <p:timing>
+    <p:tnLst>
+      <p:par>
+        <p:cTn id="1" dur="indefinite" restart="never" nodeType="tmRoot"/>
+      </p:par>
+    </p:tnLst>
+  </p:timing>
 </p:sld>
 </file>
 
@@ -26906,6 +27242,13 @@
   <p:clrMapOvr>
     <a:masterClrMapping/>
   </p:clrMapOvr>
+  <p:timing>
+    <p:tnLst>
+      <p:par>
+        <p:cTn id="1" dur="indefinite" restart="never" nodeType="tmRoot"/>
+      </p:par>
+    </p:tnLst>
+  </p:timing>
 </p:sld>
 </file>
 
@@ -26965,6 +27308,13 @@
   <p:clrMapOvr>
     <a:masterClrMapping/>
   </p:clrMapOvr>
+  <p:timing>
+    <p:tnLst>
+      <p:par>
+        <p:cTn id="1" dur="indefinite" restart="never" nodeType="tmRoot"/>
+      </p:par>
+    </p:tnLst>
+  </p:timing>
 </p:sld>
 </file>
 
@@ -27803,6 +28153,13 @@
   <p:clrMapOvr>
     <a:masterClrMapping/>
   </p:clrMapOvr>
+  <p:timing>
+    <p:tnLst>
+      <p:par>
+        <p:cTn id="1" dur="indefinite" restart="never" nodeType="tmRoot"/>
+      </p:par>
+    </p:tnLst>
+  </p:timing>
 </p:sld>
 </file>
 
@@ -27882,6 +28239,13 @@
   <p:clrMapOvr>
     <a:masterClrMapping/>
   </p:clrMapOvr>
+  <p:timing>
+    <p:tnLst>
+      <p:par>
+        <p:cTn id="1" dur="indefinite" restart="never" nodeType="tmRoot"/>
+      </p:par>
+    </p:tnLst>
+  </p:timing>
 </p:sld>
 </file>
 
@@ -29054,6 +29418,13 @@
   <p:clrMapOvr>
     <a:masterClrMapping/>
   </p:clrMapOvr>
+  <p:timing>
+    <p:tnLst>
+      <p:par>
+        <p:cTn id="1" dur="indefinite" restart="never" nodeType="tmRoot"/>
+      </p:par>
+    </p:tnLst>
+  </p:timing>
 </p:sld>
 </file>
 
@@ -29226,6 +29597,13 @@
   <p:clrMapOvr>
     <a:masterClrMapping/>
   </p:clrMapOvr>
+  <p:timing>
+    <p:tnLst>
+      <p:par>
+        <p:cTn id="1" dur="indefinite" restart="never" nodeType="tmRoot"/>
+      </p:par>
+    </p:tnLst>
+  </p:timing>
 </p:sld>
 </file>
 
@@ -29282,7 +29660,7 @@
         <p:spPr/>
         <p:txBody>
           <a:bodyPr>
-            <a:normAutofit lnSpcReduction="10000"/>
+            <a:normAutofit/>
           </a:bodyPr>
           <a:lstStyle/>
           <a:p>
@@ -29294,19 +29672,12 @@
           </a:p>
           <a:p>
             <a:r>
+              <a:rPr lang="es-ES_tradnl" i="1" dirty="0" smtClean="0"/>
+              <a:t>SI </a:t>
+            </a:r>
+            <a:r>
               <a:rPr lang="es-ES_tradnl" i="1" dirty="0"/>
-              <a:t>Ya se tiene un libro lleno de estándares y procedimientos para la construcción de software. ¿Esto proporcionara a mi gente todo el conocimiento</a:t>
-            </a:r>
-            <a:r>
-              <a:rPr lang="es-ES_tradnl" i="1" dirty="0" smtClean="0"/>
-              <a:t>?</a:t>
-            </a:r>
-            <a:endParaRPr lang="en-US" dirty="0"/>
-          </a:p>
-          <a:p>
-            <a:r>
-              <a:rPr lang="es-ES_tradnl" i="1" dirty="0"/>
-              <a:t>SI se está atrasado en el itinerario es posible contratar más programadores para así terminar a tiempo</a:t>
+              <a:t>se está atrasado en el itinerario es posible contratar más programadores para así terminar a tiempo</a:t>
             </a:r>
             <a:r>
               <a:rPr lang="es-ES_tradnl" i="1" dirty="0" smtClean="0"/>
@@ -29315,33 +29686,9 @@
             <a:endParaRPr lang="en-US" dirty="0"/>
           </a:p>
           <a:p>
-            <a:r>
-              <a:rPr lang="es-ES_tradnl" i="1" dirty="0"/>
-              <a:t>Si decido subcontratar el proyecto de software a un tercero, puedo relajarme y dejar que esa compañía la construya</a:t>
-            </a:r>
-            <a:r>
-              <a:rPr lang="es-ES_tradnl" i="1" dirty="0" smtClean="0"/>
-              <a:t>.</a:t>
-            </a:r>
-          </a:p>
-          <a:p>
-            <a:r>
-              <a:rPr lang="es-ES_tradnl" b="1" dirty="0"/>
-              <a:t>Mitos del Cliente</a:t>
-            </a:r>
-            <a:endParaRPr lang="en-US" dirty="0"/>
-          </a:p>
-          <a:p>
-            <a:r>
-              <a:rPr lang="es-ES_tradnl" i="1" dirty="0"/>
-              <a:t>Un enunciado general de los objetivos es suficiente para comenzar a escribir programas, los detalles se pueden afinar </a:t>
-            </a:r>
-            <a:r>
-              <a:rPr lang="es-ES_tradnl" i="1" dirty="0" smtClean="0"/>
-              <a:t>después</a:t>
-            </a:r>
-          </a:p>
-          <a:p>
+            <a:pPr marL="0" indent="0">
+              <a:buNone/>
+            </a:pPr>
             <a:endParaRPr lang="es-ES_tradnl" i="1" dirty="0"/>
           </a:p>
           <a:p>
@@ -29390,6 +29737,13 @@
   <p:clrMapOvr>
     <a:masterClrMapping/>
   </p:clrMapOvr>
+  <p:timing>
+    <p:tnLst>
+      <p:par>
+        <p:cTn id="1" dur="indefinite" restart="never" nodeType="tmRoot"/>
+      </p:par>
+    </p:tnLst>
+  </p:timing>
 </p:sld>
 </file>
 
@@ -29479,6 +29833,13 @@
   <p:clrMapOvr>
     <a:masterClrMapping/>
   </p:clrMapOvr>
+  <p:timing>
+    <p:tnLst>
+      <p:par>
+        <p:cTn id="1" dur="indefinite" restart="never" nodeType="tmRoot"/>
+      </p:par>
+    </p:tnLst>
+  </p:timing>
 </p:sld>
 </file>
 
@@ -29772,6 +30133,13 @@
   <p:clrMapOvr>
     <a:masterClrMapping/>
   </p:clrMapOvr>
+  <p:timing>
+    <p:tnLst>
+      <p:par>
+        <p:cTn id="1" dur="indefinite" restart="never" nodeType="tmRoot"/>
+      </p:par>
+    </p:tnLst>
+  </p:timing>
 </p:sld>
 </file>
 
@@ -29814,46 +30182,6 @@
           </a:bodyPr>
           <a:lstStyle/>
           <a:p>
-            <a:r>
-              <a:rPr lang="es-AR" sz="3600" b="1" dirty="0"/>
-              <a:t>¿Por qué es importante</a:t>
-            </a:r>
-            <a:r>
-              <a:rPr lang="es-AR" sz="3600" b="1" dirty="0" smtClean="0"/>
-              <a:t>?</a:t>
-            </a:r>
-          </a:p>
-          <a:p>
-            <a:r>
-              <a:rPr lang="es-AR" dirty="0" smtClean="0"/>
-              <a:t>El </a:t>
-            </a:r>
-            <a:r>
-              <a:rPr lang="es-AR" dirty="0"/>
-              <a:t>software es importante porque afecta a casi todos los aspectos de nuestras vidas y ha invadido nuestro comercio, cultura y actividades cotidianas. La ingeniería de software es importante porque nos permite construir sistemas complejos en un tiempo razonable </a:t>
-            </a:r>
-            <a:r>
-              <a:rPr lang="en-US" dirty="0"/>
-              <a:t>y con </a:t>
-            </a:r>
-            <a:r>
-              <a:rPr lang="en-US" dirty="0" err="1"/>
-              <a:t>alta</a:t>
-            </a:r>
-            <a:r>
-              <a:rPr lang="en-US" dirty="0"/>
-              <a:t> </a:t>
-            </a:r>
-            <a:r>
-              <a:rPr lang="en-US" dirty="0" err="1"/>
-              <a:t>calidad</a:t>
-            </a:r>
-            <a:r>
-              <a:rPr lang="en-US" dirty="0"/>
-              <a:t>.</a:t>
-            </a:r>
-          </a:p>
-          <a:p>
             <a:endParaRPr lang="es-AR" b="1" dirty="0" smtClean="0"/>
           </a:p>
           <a:p>
@@ -29929,6 +30257,13 @@
   <p:clrMapOvr>
     <a:masterClrMapping/>
   </p:clrMapOvr>
+  <p:timing>
+    <p:tnLst>
+      <p:par>
+        <p:cTn id="1" dur="indefinite" restart="never" nodeType="tmRoot"/>
+      </p:par>
+    </p:tnLst>
+  </p:timing>
 </p:sld>
 </file>
 
@@ -30093,6 +30428,13 @@
   <p:clrMapOvr>
     <a:masterClrMapping/>
   </p:clrMapOvr>
+  <p:timing>
+    <p:tnLst>
+      <p:par>
+        <p:cTn id="1" dur="indefinite" restart="never" nodeType="tmRoot"/>
+      </p:par>
+    </p:tnLst>
+  </p:timing>
 </p:sld>
 </file>
 
@@ -30154,6 +30496,13 @@
   <p:clrMapOvr>
     <a:masterClrMapping/>
   </p:clrMapOvr>
+  <p:timing>
+    <p:tnLst>
+      <p:par>
+        <p:cTn id="1" dur="indefinite" restart="never" nodeType="tmRoot"/>
+      </p:par>
+    </p:tnLst>
+  </p:timing>
 </p:sld>
 </file>
 
@@ -30247,6 +30596,13 @@
   <p:clrMapOvr>
     <a:masterClrMapping/>
   </p:clrMapOvr>
+  <p:timing>
+    <p:tnLst>
+      <p:par>
+        <p:cTn id="1" dur="indefinite" restart="never" nodeType="tmRoot"/>
+      </p:par>
+    </p:tnLst>
+  </p:timing>
 </p:sld>
 </file>
 
@@ -30491,4 +30847,265 @@
     </a:ext>
   </a:extLst>
 </a:theme>
+</file>
+
+<file path=ppt/theme/theme2.xml><?xml version="1.0" encoding="utf-8"?>
+<a:theme xmlns:a="http://schemas.openxmlformats.org/drawingml/2006/main" name="Office Theme">
+  <a:themeElements>
+    <a:clrScheme name="Office">
+      <a:dk1>
+        <a:sysClr val="windowText" lastClr="000000"/>
+      </a:dk1>
+      <a:lt1>
+        <a:sysClr val="window" lastClr="FFFFFF"/>
+      </a:lt1>
+      <a:dk2>
+        <a:srgbClr val="44546A"/>
+      </a:dk2>
+      <a:lt2>
+        <a:srgbClr val="E7E6E6"/>
+      </a:lt2>
+      <a:accent1>
+        <a:srgbClr val="5B9BD5"/>
+      </a:accent1>
+      <a:accent2>
+        <a:srgbClr val="ED7D31"/>
+      </a:accent2>
+      <a:accent3>
+        <a:srgbClr val="A5A5A5"/>
+      </a:accent3>
+      <a:accent4>
+        <a:srgbClr val="FFC000"/>
+      </a:accent4>
+      <a:accent5>
+        <a:srgbClr val="4472C4"/>
+      </a:accent5>
+      <a:accent6>
+        <a:srgbClr val="70AD47"/>
+      </a:accent6>
+      <a:hlink>
+        <a:srgbClr val="0563C1"/>
+      </a:hlink>
+      <a:folHlink>
+        <a:srgbClr val="954F72"/>
+      </a:folHlink>
+    </a:clrScheme>
+    <a:fontScheme name="Office">
+      <a:majorFont>
+        <a:latin typeface="Calibri Light" panose="020F0302020204030204"/>
+        <a:ea typeface=""/>
+        <a:cs typeface=""/>
+        <a:font script="Jpan" typeface="游ゴシック Light"/>
+        <a:font script="Hang" typeface="맑은 고딕"/>
+        <a:font script="Hans" typeface="等线 Light"/>
+        <a:font script="Hant" typeface="新細明體"/>
+        <a:font script="Arab" typeface="Times New Roman"/>
+        <a:font script="Hebr" typeface="Times New Roman"/>
+        <a:font script="Thai" typeface="Angsana New"/>
+        <a:font script="Ethi" typeface="Nyala"/>
+        <a:font script="Beng" typeface="Vrinda"/>
+        <a:font script="Gujr" typeface="Shruti"/>
+        <a:font script="Khmr" typeface="MoolBoran"/>
+        <a:font script="Knda" typeface="Tunga"/>
+        <a:font script="Guru" typeface="Raavi"/>
+        <a:font script="Cans" typeface="Euphemia"/>
+        <a:font script="Cher" typeface="Plantagenet Cherokee"/>
+        <a:font script="Yiii" typeface="Microsoft Yi Baiti"/>
+        <a:font script="Tibt" typeface="Microsoft Himalaya"/>
+        <a:font script="Thaa" typeface="MV Boli"/>
+        <a:font script="Deva" typeface="Mangal"/>
+        <a:font script="Telu" typeface="Gautami"/>
+        <a:font script="Taml" typeface="Latha"/>
+        <a:font script="Syrc" typeface="Estrangelo Edessa"/>
+        <a:font script="Orya" typeface="Kalinga"/>
+        <a:font script="Mlym" typeface="Kartika"/>
+        <a:font script="Laoo" typeface="DokChampa"/>
+        <a:font script="Sinh" typeface="Iskoola Pota"/>
+        <a:font script="Mong" typeface="Mongolian Baiti"/>
+        <a:font script="Viet" typeface="Times New Roman"/>
+        <a:font script="Uigh" typeface="Microsoft Uighur"/>
+        <a:font script="Geor" typeface="Sylfaen"/>
+      </a:majorFont>
+      <a:minorFont>
+        <a:latin typeface="Calibri" panose="020F0502020204030204"/>
+        <a:ea typeface=""/>
+        <a:cs typeface=""/>
+        <a:font script="Jpan" typeface="游ゴシック"/>
+        <a:font script="Hang" typeface="맑은 고딕"/>
+        <a:font script="Hans" typeface="等线"/>
+        <a:font script="Hant" typeface="新細明體"/>
+        <a:font script="Arab" typeface="Arial"/>
+        <a:font script="Hebr" typeface="Arial"/>
+        <a:font script="Thai" typeface="Cordia New"/>
+        <a:font script="Ethi" typeface="Nyala"/>
+        <a:font script="Beng" typeface="Vrinda"/>
+        <a:font script="Gujr" typeface="Shruti"/>
+        <a:font script="Khmr" typeface="DaunPenh"/>
+        <a:font script="Knda" typeface="Tunga"/>
+        <a:font script="Guru" typeface="Raavi"/>
+        <a:font script="Cans" typeface="Euphemia"/>
+        <a:font script="Cher" typeface="Plantagenet Cherokee"/>
+        <a:font script="Yiii" typeface="Microsoft Yi Baiti"/>
+        <a:font script="Tibt" typeface="Microsoft Himalaya"/>
+        <a:font script="Thaa" typeface="MV Boli"/>
+        <a:font script="Deva" typeface="Mangal"/>
+        <a:font script="Telu" typeface="Gautami"/>
+        <a:font script="Taml" typeface="Latha"/>
+        <a:font script="Syrc" typeface="Estrangelo Edessa"/>
+        <a:font script="Orya" typeface="Kalinga"/>
+        <a:font script="Mlym" typeface="Kartika"/>
+        <a:font script="Laoo" typeface="DokChampa"/>
+        <a:font script="Sinh" typeface="Iskoola Pota"/>
+        <a:font script="Mong" typeface="Mongolian Baiti"/>
+        <a:font script="Viet" typeface="Arial"/>
+        <a:font script="Uigh" typeface="Microsoft Uighur"/>
+        <a:font script="Geor" typeface="Sylfaen"/>
+      </a:minorFont>
+    </a:fontScheme>
+    <a:fmtScheme name="Office">
+      <a:fillStyleLst>
+        <a:solidFill>
+          <a:schemeClr val="phClr"/>
+        </a:solidFill>
+        <a:gradFill rotWithShape="1">
+          <a:gsLst>
+            <a:gs pos="0">
+              <a:schemeClr val="phClr">
+                <a:lumMod val="110000"/>
+                <a:satMod val="105000"/>
+                <a:tint val="67000"/>
+              </a:schemeClr>
+            </a:gs>
+            <a:gs pos="50000">
+              <a:schemeClr val="phClr">
+                <a:lumMod val="105000"/>
+                <a:satMod val="103000"/>
+                <a:tint val="73000"/>
+              </a:schemeClr>
+            </a:gs>
+            <a:gs pos="100000">
+              <a:schemeClr val="phClr">
+                <a:lumMod val="105000"/>
+                <a:satMod val="109000"/>
+                <a:tint val="81000"/>
+              </a:schemeClr>
+            </a:gs>
+          </a:gsLst>
+          <a:lin ang="5400000" scaled="0"/>
+        </a:gradFill>
+        <a:gradFill rotWithShape="1">
+          <a:gsLst>
+            <a:gs pos="0">
+              <a:schemeClr val="phClr">
+                <a:satMod val="103000"/>
+                <a:lumMod val="102000"/>
+                <a:tint val="94000"/>
+              </a:schemeClr>
+            </a:gs>
+            <a:gs pos="50000">
+              <a:schemeClr val="phClr">
+                <a:satMod val="110000"/>
+                <a:lumMod val="100000"/>
+                <a:shade val="100000"/>
+              </a:schemeClr>
+            </a:gs>
+            <a:gs pos="100000">
+              <a:schemeClr val="phClr">
+                <a:lumMod val="99000"/>
+                <a:satMod val="120000"/>
+                <a:shade val="78000"/>
+              </a:schemeClr>
+            </a:gs>
+          </a:gsLst>
+          <a:lin ang="5400000" scaled="0"/>
+        </a:gradFill>
+      </a:fillStyleLst>
+      <a:lnStyleLst>
+        <a:ln w="6350" cap="flat" cmpd="sng" algn="ctr">
+          <a:solidFill>
+            <a:schemeClr val="phClr"/>
+          </a:solidFill>
+          <a:prstDash val="solid"/>
+          <a:miter lim="800000"/>
+        </a:ln>
+        <a:ln w="12700" cap="flat" cmpd="sng" algn="ctr">
+          <a:solidFill>
+            <a:schemeClr val="phClr"/>
+          </a:solidFill>
+          <a:prstDash val="solid"/>
+          <a:miter lim="800000"/>
+        </a:ln>
+        <a:ln w="19050" cap="flat" cmpd="sng" algn="ctr">
+          <a:solidFill>
+            <a:schemeClr val="phClr"/>
+          </a:solidFill>
+          <a:prstDash val="solid"/>
+          <a:miter lim="800000"/>
+        </a:ln>
+      </a:lnStyleLst>
+      <a:effectStyleLst>
+        <a:effectStyle>
+          <a:effectLst/>
+        </a:effectStyle>
+        <a:effectStyle>
+          <a:effectLst/>
+        </a:effectStyle>
+        <a:effectStyle>
+          <a:effectLst>
+            <a:outerShdw blurRad="57150" dist="19050" dir="5400000" algn="ctr" rotWithShape="0">
+              <a:srgbClr val="000000">
+                <a:alpha val="63000"/>
+              </a:srgbClr>
+            </a:outerShdw>
+          </a:effectLst>
+        </a:effectStyle>
+      </a:effectStyleLst>
+      <a:bgFillStyleLst>
+        <a:solidFill>
+          <a:schemeClr val="phClr"/>
+        </a:solidFill>
+        <a:solidFill>
+          <a:schemeClr val="phClr">
+            <a:tint val="95000"/>
+            <a:satMod val="170000"/>
+          </a:schemeClr>
+        </a:solidFill>
+        <a:gradFill rotWithShape="1">
+          <a:gsLst>
+            <a:gs pos="0">
+              <a:schemeClr val="phClr">
+                <a:tint val="93000"/>
+                <a:satMod val="150000"/>
+                <a:shade val="98000"/>
+                <a:lumMod val="102000"/>
+              </a:schemeClr>
+            </a:gs>
+            <a:gs pos="50000">
+              <a:schemeClr val="phClr">
+                <a:tint val="98000"/>
+                <a:satMod val="130000"/>
+                <a:shade val="90000"/>
+                <a:lumMod val="103000"/>
+              </a:schemeClr>
+            </a:gs>
+            <a:gs pos="100000">
+              <a:schemeClr val="phClr">
+                <a:shade val="63000"/>
+                <a:satMod val="120000"/>
+              </a:schemeClr>
+            </a:gs>
+          </a:gsLst>
+          <a:lin ang="5400000" scaled="0"/>
+        </a:gradFill>
+      </a:bgFillStyleLst>
+    </a:fmtScheme>
+  </a:themeElements>
+  <a:objectDefaults/>
+  <a:extraClrSchemeLst/>
+  <a:extLst>
+    <a:ext uri="{05A4C25C-085E-4340-85A3-A5531E510DB2}">
+      <thm15:themeFamily xmlns:thm15="http://schemas.microsoft.com/office/thememl/2012/main" name="Office Theme" id="{62F939B6-93AF-4DB8-9C6B-D6C7DFDC589F}" vid="{4A3C46E8-61CC-4603-A589-7422A47A8E4A}"/>
+    </a:ext>
+  </a:extLst>
+</a:theme>
 </file>
</xml_diff>